<commit_message>
minor mods/tweaks to several slide decks
</commit_message>
<xml_diff>
--- a/Agile Firestarter Autumn 2010 Entry Rotation.pptx
+++ b/Agile Firestarter Autumn 2010 Entry Rotation.pptx
@@ -225,19 +225,19 @@
                 <c:formatCode>0%</c:formatCode>
                 <c:ptCount val="5"/>
                 <c:pt idx="0">
-                  <c:v>0.28000000000000008</c:v>
+                  <c:v>0.26</c:v>
                 </c:pt>
                 <c:pt idx="1">
-                  <c:v>0.34000000000000025</c:v>
+                  <c:v>0.37</c:v>
                 </c:pt>
                 <c:pt idx="2">
-                  <c:v>0.23</c:v>
+                  <c:v>0.24</c:v>
                 </c:pt>
                 <c:pt idx="3">
-                  <c:v>8.0000000000000057E-2</c:v>
+                  <c:v>0.04</c:v>
                 </c:pt>
                 <c:pt idx="4">
-                  <c:v>7.0000000000000034E-2</c:v>
+                  <c:v>0.1</c:v>
                 </c:pt>
               </c:numCache>
             </c:numRef>
@@ -358,7 +358,7 @@
             <a:fld id="{CC9D1E90-0DC1-41C0-86D7-5FF0EBE9F9D3}" type="datetimeFigureOut">
               <a:rPr lang="en-US" smtClean="0"/>
               <a:pPr/>
-              <a:t>11/2/2010</a:t>
+              <a:t>11/9/2010</a:t>
             </a:fld>
             <a:endParaRPr lang="en-US"/>
           </a:p>
@@ -2567,7 +2567,7 @@
             <a:fld id="{F2BCC184-CBE3-4F29-A273-6F4E5CFA4DFC}" type="datetimeFigureOut">
               <a:rPr lang="en-US" smtClean="0"/>
               <a:pPr/>
-              <a:t>11/2/2010</a:t>
+              <a:t>11/9/2010</a:t>
             </a:fld>
             <a:endParaRPr lang="en-US"/>
           </a:p>
@@ -2712,23 +2712,7 @@
                   <a:schemeClr val="bg1"/>
                 </a:solidFill>
               </a:rPr>
-              <a:t> </a:t>
-            </a:r>
-            <a:r>
-              <a:rPr lang="en-US" i="0" baseline="0" dirty="0" smtClean="0">
-                <a:solidFill>
-                  <a:schemeClr val="bg1"/>
-                </a:solidFill>
-              </a:rPr>
-              <a:t>Autumn </a:t>
-            </a:r>
-            <a:r>
-              <a:rPr lang="en-US" i="0" baseline="0" dirty="0" smtClean="0">
-                <a:solidFill>
-                  <a:schemeClr val="bg1"/>
-                </a:solidFill>
-              </a:rPr>
-              <a:t>2010</a:t>
+              <a:t> Autumn 2010</a:t>
             </a:r>
             <a:endParaRPr lang="en-US" i="0" dirty="0">
               <a:solidFill>
@@ -3168,7 +3152,13 @@
         <p:nvGraphicFramePr>
           <p:cNvPr id="4" name="Chart 3"/>
           <p:cNvGraphicFramePr/>
-          <p:nvPr/>
+          <p:nvPr>
+            <p:extLst>
+              <p:ext uri="{D42A27DB-BD31-4B8C-83A1-F6EECF244321}">
+                <p14:modId xmlns:p14="http://schemas.microsoft.com/office/powerpoint/2010/main" val="3682478547"/>
+              </p:ext>
+            </p:extLst>
+          </p:nvPr>
         </p:nvGraphicFramePr>
         <p:xfrm>
           <a:off x="3505200" y="685800"/>

</xml_diff>